<commit_message>
Updated presentation for lab 04.
</commit_message>
<xml_diff>
--- a/04_IoC/PV239-Xamarin-04_IoC.pptx
+++ b/04_IoC/PV239-Xamarin-04_IoC.pptx
@@ -22184,6 +22184,24 @@
           <a:lstStyle/>
           <a:p>
             <a:r>
+              <a:rPr lang="sk-SK" b="1" dirty="0" err="1"/>
+              <a:t>Deadline</a:t>
+            </a:r>
+            <a:r>
+              <a:rPr lang="sk-SK" b="1" dirty="0"/>
+              <a:t> pro „draft“ </a:t>
+            </a:r>
+            <a:r>
+              <a:rPr lang="sk-SK" b="1" dirty="0" err="1"/>
+              <a:t>zadání</a:t>
+            </a:r>
+            <a:r>
+              <a:rPr lang="sk-SK" b="1" dirty="0"/>
+              <a:t> projektu – 17. 3. 2020</a:t>
+            </a:r>
+          </a:p>
+          <a:p>
+            <a:r>
               <a:rPr lang="sk-SK" dirty="0" err="1"/>
               <a:t>Deadline</a:t>
             </a:r>
@@ -22201,23 +22219,7 @@
             </a:r>
             <a:r>
               <a:rPr lang="en-US" dirty="0"/>
-              <a:t> – </a:t>
-            </a:r>
-            <a:r>
-              <a:rPr lang="en-US" dirty="0" err="1"/>
-              <a:t>posun</a:t>
-            </a:r>
-            <a:r>
-              <a:rPr lang="en-US" dirty="0"/>
-              <a:t> </a:t>
-            </a:r>
-            <a:r>
-              <a:rPr lang="en-US" dirty="0" err="1"/>
-              <a:t>na</a:t>
-            </a:r>
-            <a:r>
-              <a:rPr lang="en-US" dirty="0"/>
-              <a:t> 22. 3. 2020</a:t>
+              <a:t> –22. 3. 2020</a:t>
             </a:r>
             <a:endParaRPr lang="sk-SK" dirty="0"/>
           </a:p>
@@ -22321,24 +22323,6 @@
             <a:r>
               <a:rPr lang="sk-SK" dirty="0"/>
               <a:t> – Adobe XD)</a:t>
-            </a:r>
-          </a:p>
-          <a:p>
-            <a:r>
-              <a:rPr lang="sk-SK" dirty="0" err="1"/>
-              <a:t>Deadline</a:t>
-            </a:r>
-            <a:r>
-              <a:rPr lang="sk-SK" dirty="0"/>
-              <a:t> pro „draft“ </a:t>
-            </a:r>
-            <a:r>
-              <a:rPr lang="sk-SK" dirty="0" err="1"/>
-              <a:t>zadání</a:t>
-            </a:r>
-            <a:r>
-              <a:rPr lang="sk-SK" dirty="0"/>
-              <a:t> projektu – 17. 3. 2020</a:t>
             </a:r>
           </a:p>
           <a:p>

</xml_diff>